<commit_message>
updated ppt, implemented example solution
</commit_message>
<xml_diff>
--- a/ConwaySequence/DojoPresiVorlage.pptx
+++ b/ConwaySequence/DojoPresiVorlage.pptx
@@ -5,7 +5,7 @@
     <p:sldMasterId id="2147483648" r:id="rId1"/>
   </p:sldMasterIdLst>
   <p:notesMasterIdLst>
-    <p:notesMasterId r:id="rId7"/>
+    <p:notesMasterId r:id="rId8"/>
   </p:notesMasterIdLst>
   <p:sldIdLst>
     <p:sldId id="270" r:id="rId2"/>
@@ -13,6 +13,7 @@
     <p:sldId id="266" r:id="rId4"/>
     <p:sldId id="267" r:id="rId5"/>
     <p:sldId id="268" r:id="rId6"/>
+    <p:sldId id="271" r:id="rId7"/>
   </p:sldIdLst>
   <p:sldSz cx="12192000" cy="6858000"/>
   <p:notesSz cx="6858000" cy="9144000"/>
@@ -212,7 +213,7 @@
           <a:p>
             <a:fld id="{550C01F7-036F-4DDB-91D3-72DE411FB950}" type="datetimeFigureOut">
               <a:rPr lang="de-AT" smtClean="0"/>
-              <a:t>21.01.2021</a:t>
+              <a:t>05.03.2021</a:t>
             </a:fld>
             <a:endParaRPr lang="de-AT"/>
           </a:p>
@@ -1444,21 +1445,6 @@
           <a:bodyPr/>
           <a:lstStyle/>
           <a:p>
-            <a:r>
-              <a:rPr lang="en-US" dirty="0" smtClean="0"/>
-              <a:t>Challenge</a:t>
-            </a:r>
-            <a:r>
-              <a:rPr lang="en-US" baseline="0" dirty="0" smtClean="0"/>
-              <a:t> Inputs: </a:t>
-            </a:r>
-            <a:r>
-              <a:rPr lang="en-US" dirty="0" smtClean="0"/>
-              <a:t>-1, 0, 1, 2500</a:t>
-            </a:r>
-            <a:endParaRPr lang="de-AT" dirty="0" smtClean="0"/>
-          </a:p>
-          <a:p>
             <a:endParaRPr lang="de-AT" dirty="0"/>
           </a:p>
         </p:txBody>
@@ -1630,7 +1616,7 @@
           <a:p>
             <a:fld id="{4F9BBA49-313F-47D7-A954-C3F504465317}" type="datetimeFigureOut">
               <a:rPr lang="de-AT" smtClean="0"/>
-              <a:t>21.01.2021</a:t>
+              <a:t>05.03.2021</a:t>
             </a:fld>
             <a:endParaRPr lang="de-AT"/>
           </a:p>
@@ -1800,7 +1786,7 @@
           <a:p>
             <a:fld id="{4F9BBA49-313F-47D7-A954-C3F504465317}" type="datetimeFigureOut">
               <a:rPr lang="de-AT" smtClean="0"/>
-              <a:t>21.01.2021</a:t>
+              <a:t>05.03.2021</a:t>
             </a:fld>
             <a:endParaRPr lang="de-AT"/>
           </a:p>
@@ -1980,7 +1966,7 @@
           <a:p>
             <a:fld id="{4F9BBA49-313F-47D7-A954-C3F504465317}" type="datetimeFigureOut">
               <a:rPr lang="de-AT" smtClean="0"/>
-              <a:t>21.01.2021</a:t>
+              <a:t>05.03.2021</a:t>
             </a:fld>
             <a:endParaRPr lang="de-AT"/>
           </a:p>
@@ -2150,7 +2136,7 @@
           <a:p>
             <a:fld id="{4F9BBA49-313F-47D7-A954-C3F504465317}" type="datetimeFigureOut">
               <a:rPr lang="de-AT" smtClean="0"/>
-              <a:t>21.01.2021</a:t>
+              <a:t>05.03.2021</a:t>
             </a:fld>
             <a:endParaRPr lang="de-AT"/>
           </a:p>
@@ -2396,7 +2382,7 @@
           <a:p>
             <a:fld id="{4F9BBA49-313F-47D7-A954-C3F504465317}" type="datetimeFigureOut">
               <a:rPr lang="de-AT" smtClean="0"/>
-              <a:t>21.01.2021</a:t>
+              <a:t>05.03.2021</a:t>
             </a:fld>
             <a:endParaRPr lang="de-AT"/>
           </a:p>
@@ -2628,7 +2614,7 @@
           <a:p>
             <a:fld id="{4F9BBA49-313F-47D7-A954-C3F504465317}" type="datetimeFigureOut">
               <a:rPr lang="de-AT" smtClean="0"/>
-              <a:t>21.01.2021</a:t>
+              <a:t>05.03.2021</a:t>
             </a:fld>
             <a:endParaRPr lang="de-AT"/>
           </a:p>
@@ -2995,7 +2981,7 @@
           <a:p>
             <a:fld id="{4F9BBA49-313F-47D7-A954-C3F504465317}" type="datetimeFigureOut">
               <a:rPr lang="de-AT" smtClean="0"/>
-              <a:t>21.01.2021</a:t>
+              <a:t>05.03.2021</a:t>
             </a:fld>
             <a:endParaRPr lang="de-AT"/>
           </a:p>
@@ -3113,7 +3099,7 @@
           <a:p>
             <a:fld id="{4F9BBA49-313F-47D7-A954-C3F504465317}" type="datetimeFigureOut">
               <a:rPr lang="de-AT" smtClean="0"/>
-              <a:t>21.01.2021</a:t>
+              <a:t>05.03.2021</a:t>
             </a:fld>
             <a:endParaRPr lang="de-AT"/>
           </a:p>
@@ -3208,7 +3194,7 @@
           <a:p>
             <a:fld id="{4F9BBA49-313F-47D7-A954-C3F504465317}" type="datetimeFigureOut">
               <a:rPr lang="de-AT" smtClean="0"/>
-              <a:t>21.01.2021</a:t>
+              <a:t>05.03.2021</a:t>
             </a:fld>
             <a:endParaRPr lang="de-AT"/>
           </a:p>
@@ -3485,7 +3471,7 @@
           <a:p>
             <a:fld id="{4F9BBA49-313F-47D7-A954-C3F504465317}" type="datetimeFigureOut">
               <a:rPr lang="de-AT" smtClean="0"/>
-              <a:t>21.01.2021</a:t>
+              <a:t>05.03.2021</a:t>
             </a:fld>
             <a:endParaRPr lang="de-AT"/>
           </a:p>
@@ -3738,7 +3724,7 @@
           <a:p>
             <a:fld id="{4F9BBA49-313F-47D7-A954-C3F504465317}" type="datetimeFigureOut">
               <a:rPr lang="de-AT" smtClean="0"/>
-              <a:t>21.01.2021</a:t>
+              <a:t>05.03.2021</a:t>
             </a:fld>
             <a:endParaRPr lang="de-AT"/>
           </a:p>
@@ -3951,7 +3937,7 @@
           <a:p>
             <a:fld id="{4F9BBA49-313F-47D7-A954-C3F504465317}" type="datetimeFigureOut">
               <a:rPr lang="de-AT" smtClean="0"/>
-              <a:t>21.01.2021</a:t>
+              <a:t>05.03.2021</a:t>
             </a:fld>
             <a:endParaRPr lang="de-AT"/>
           </a:p>
@@ -4380,7 +4366,11 @@
             </a:br>
             <a:r>
               <a:rPr lang="de-AT" sz="2400" b="1" dirty="0" smtClean="0"/>
-              <a:t>XX.02.2021</a:t>
+              <a:t>05</a:t>
+            </a:r>
+            <a:r>
+              <a:rPr lang="de-AT" sz="2400" b="1" dirty="0" smtClean="0"/>
+              <a:t>.03.2021</a:t>
             </a:r>
             <a:endParaRPr lang="de-AT" sz="1800" b="1" dirty="0"/>
           </a:p>
@@ -4460,6 +4450,13 @@
   <p:clrMapOvr>
     <a:masterClrMapping/>
   </p:clrMapOvr>
+  <p:timing>
+    <p:tnLst>
+      <p:par>
+        <p:cTn id="1" dur="indefinite" restart="never" nodeType="tmRoot"/>
+      </p:par>
+    </p:tnLst>
+  </p:timing>
 </p:sld>
 </file>
 
@@ -6100,6 +6097,13 @@
   <p:clrMapOvr>
     <a:masterClrMapping/>
   </p:clrMapOvr>
+  <p:timing>
+    <p:tnLst>
+      <p:par>
+        <p:cTn id="1" dur="indefinite" restart="never" nodeType="tmRoot"/>
+      </p:par>
+    </p:tnLst>
+  </p:timing>
 </p:sld>
 </file>
 
@@ -6214,7 +6218,6 @@
               <a:rPr lang="en-US" dirty="0" smtClean="0"/>
               <a:t>Edge Cases?</a:t>
             </a:r>
-            <a:endParaRPr lang="en-US" dirty="0" smtClean="0"/>
           </a:p>
           <a:p>
             <a:r>
@@ -6235,11 +6238,7 @@
             </a:r>
             <a:r>
               <a:rPr lang="en-US" dirty="0" err="1" smtClean="0"/>
-              <a:t>kleine</a:t>
-            </a:r>
-            <a:r>
-              <a:rPr lang="en-US" dirty="0" err="1" smtClean="0"/>
-              <a:t>r</a:t>
+              <a:t>kleiner</a:t>
             </a:r>
             <a:r>
               <a:rPr lang="en-US" dirty="0" smtClean="0"/>
@@ -6282,6 +6281,177 @@
     <p:extLst>
       <p:ext uri="{BB962C8B-B14F-4D97-AF65-F5344CB8AC3E}">
         <p14:creationId xmlns:p14="http://schemas.microsoft.com/office/powerpoint/2010/main" val="1036106129"/>
+      </p:ext>
+    </p:extLst>
+  </p:cSld>
+  <p:clrMapOvr>
+    <a:masterClrMapping/>
+  </p:clrMapOvr>
+  <p:timing>
+    <p:tnLst>
+      <p:par>
+        <p:cTn id="1" dur="indefinite" restart="never" nodeType="tmRoot"/>
+      </p:par>
+    </p:tnLst>
+  </p:timing>
+</p:sld>
+</file>
+
+<file path=ppt/slides/slide6.xml><?xml version="1.0" encoding="utf-8"?>
+<p:sld xmlns:a="http://schemas.openxmlformats.org/drawingml/2006/main" xmlns:r="http://schemas.openxmlformats.org/officeDocument/2006/relationships" xmlns:p="http://schemas.openxmlformats.org/presentationml/2006/main">
+  <p:cSld>
+    <p:spTree>
+      <p:nvGrpSpPr>
+        <p:cNvPr id="1" name=""/>
+        <p:cNvGrpSpPr/>
+        <p:nvPr/>
+      </p:nvGrpSpPr>
+      <p:grpSpPr>
+        <a:xfrm>
+          <a:off x="0" y="0"/>
+          <a:ext cx="0" cy="0"/>
+          <a:chOff x="0" y="0"/>
+          <a:chExt cx="0" cy="0"/>
+        </a:xfrm>
+      </p:grpSpPr>
+      <p:sp>
+        <p:nvSpPr>
+          <p:cNvPr id="2" name="Title 1"/>
+          <p:cNvSpPr>
+            <a:spLocks noGrp="1"/>
+          </p:cNvSpPr>
+          <p:nvPr>
+            <p:ph type="title"/>
+          </p:nvPr>
+        </p:nvSpPr>
+        <p:spPr/>
+        <p:txBody>
+          <a:bodyPr/>
+          <a:lstStyle/>
+          <a:p>
+            <a:r>
+              <a:rPr lang="en-US" dirty="0" smtClean="0"/>
+              <a:t>Setup</a:t>
+            </a:r>
+            <a:endParaRPr lang="de-AT" dirty="0"/>
+          </a:p>
+        </p:txBody>
+      </p:sp>
+      <p:sp>
+        <p:nvSpPr>
+          <p:cNvPr id="3" name="Content Placeholder 2"/>
+          <p:cNvSpPr>
+            <a:spLocks noGrp="1"/>
+          </p:cNvSpPr>
+          <p:nvPr>
+            <p:ph idx="1"/>
+          </p:nvPr>
+        </p:nvSpPr>
+        <p:spPr/>
+        <p:txBody>
+          <a:bodyPr/>
+          <a:lstStyle/>
+          <a:p>
+            <a:pPr lvl="0"/>
+            <a:r>
+              <a:rPr lang="de-AT" dirty="0"/>
+              <a:t>Den Branch ConwaySequenceDojo_TS auschecken</a:t>
+            </a:r>
+          </a:p>
+          <a:p>
+            <a:pPr lvl="0"/>
+            <a:r>
+              <a:rPr lang="de-AT" dirty="0"/>
+              <a:t>Mit Vs Code in den Ordner „\CodingDojos\ConwaySequence\Javascript\“ wechseln</a:t>
+            </a:r>
+          </a:p>
+          <a:p>
+            <a:pPr lvl="0"/>
+            <a:r>
+              <a:rPr lang="en-US" dirty="0" err="1"/>
+              <a:t>npm</a:t>
+            </a:r>
+            <a:r>
+              <a:rPr lang="en-US" dirty="0"/>
+              <a:t> </a:t>
+            </a:r>
+            <a:r>
+              <a:rPr lang="en-US" dirty="0" err="1"/>
+              <a:t>i</a:t>
+            </a:r>
+            <a:r>
+              <a:rPr lang="en-US" dirty="0"/>
+              <a:t> --save-dev @types/mocha</a:t>
+            </a:r>
+            <a:endParaRPr lang="de-AT" dirty="0"/>
+          </a:p>
+          <a:p>
+            <a:pPr lvl="1"/>
+            <a:r>
+              <a:rPr lang="de-AT" dirty="0"/>
+              <a:t>npm muss installiert sein: </a:t>
+            </a:r>
+            <a:r>
+              <a:rPr lang="de-AT" u="sng" dirty="0">
+                <a:hlinkClick r:id="rId2"/>
+              </a:rPr>
+              <a:t>https://stackoverflow.com/questions/35563802/running-npm-command-within-visual-studio-code</a:t>
+            </a:r>
+            <a:endParaRPr lang="de-AT" dirty="0"/>
+          </a:p>
+          <a:p>
+            <a:pPr lvl="0"/>
+            <a:r>
+              <a:rPr lang="en-US" dirty="0" err="1"/>
+              <a:t>npm</a:t>
+            </a:r>
+            <a:r>
+              <a:rPr lang="en-US" dirty="0"/>
+              <a:t> install --save mocha chai</a:t>
+            </a:r>
+            <a:endParaRPr lang="de-AT" dirty="0"/>
+          </a:p>
+          <a:p>
+            <a:pPr lvl="0"/>
+            <a:r>
+              <a:rPr lang="en-US" dirty="0" err="1"/>
+              <a:t>Ausführen</a:t>
+            </a:r>
+            <a:r>
+              <a:rPr lang="en-US" dirty="0"/>
+              <a:t> der Tests:</a:t>
+            </a:r>
+            <a:endParaRPr lang="de-AT" dirty="0"/>
+          </a:p>
+          <a:p>
+            <a:pPr lvl="1"/>
+            <a:r>
+              <a:rPr lang="en-US" dirty="0" err="1"/>
+              <a:t>npm</a:t>
+            </a:r>
+            <a:r>
+              <a:rPr lang="en-US" dirty="0"/>
+              <a:t> test </a:t>
+            </a:r>
+            <a:r>
+              <a:rPr lang="en-US" i="1" dirty="0" err="1"/>
+              <a:t>oder</a:t>
+            </a:r>
+            <a:r>
+              <a:rPr lang="en-US" dirty="0"/>
+              <a:t> VS Extensions -&gt; Mocha Test Explorer</a:t>
+            </a:r>
+            <a:endParaRPr lang="de-AT" dirty="0"/>
+          </a:p>
+          <a:p>
+            <a:endParaRPr lang="de-AT" dirty="0"/>
+          </a:p>
+        </p:txBody>
+      </p:sp>
+    </p:spTree>
+    <p:extLst>
+      <p:ext uri="{BB962C8B-B14F-4D97-AF65-F5344CB8AC3E}">
+        <p14:creationId xmlns:p14="http://schemas.microsoft.com/office/powerpoint/2010/main" val="2208362060"/>
       </p:ext>
     </p:extLst>
   </p:cSld>

</xml_diff>